<commit_message>
Updated Cipher Questions and PPT
</commit_message>
<xml_diff>
--- a/Senior Computer Science Club/src/com.bayviewglen.algorithms/Cipher Problems.pptx
+++ b/Senior Computer Science Club/src/com.bayviewglen.algorithms/Cipher Problems.pptx
@@ -117,6 +117,11 @@
       </a:defRPr>
     </a:lvl9pPr>
   </p:defaultTextStyle>
+  <p:extLst>
+    <p:ext uri="{EFAFB233-063F-42B5-8137-9DF3F51BA10A}">
+      <p15:sldGuideLst xmlns:p15="http://schemas.microsoft.com/office/powerpoint/2012/main"/>
+    </p:ext>
+  </p:extLst>
 </p:presentation>
 </file>
 
@@ -3530,10 +3535,12 @@
           <a:p>
             <a:r>
               <a:rPr lang="en-CA" dirty="0" smtClean="0"/>
-              <a:t>Using the key: ics3u</a:t>
-            </a:r>
-          </a:p>
-          <a:p>
+              <a:t>Using the key: </a:t>
+            </a:r>
+            <a:r>
+              <a:rPr lang="en-CA" dirty="0" err="1" smtClean="0"/>
+              <a:t>icsforyou</a:t>
+            </a:r>
             <a:endParaRPr lang="en-CA" dirty="0"/>
           </a:p>
           <a:p>
@@ -3543,7 +3550,7 @@
             </a:r>
             <a:r>
               <a:rPr lang="en-CA" dirty="0" err="1"/>
-              <a:t>qnaemeggxwlyzeghbgkna</a:t>
+              <a:t>uchxoicoawqvboprczqpvbvvpsswwswsxmwho</a:t>
             </a:r>
             <a:endParaRPr lang="en-CA" dirty="0"/>
           </a:p>
@@ -3794,7 +3801,6 @@
               <a:rPr lang="en-CA" dirty="0"/>
               <a:t>there are 30 slots in our grid, and we missed two letters in the first row, there will end up being two spare in the other rows. It doesn't matter where these spares go, so long as sender and receiver use the same system.</a:t>
             </a:r>
-            <a:endParaRPr lang="en-CA" dirty="0"/>
           </a:p>
         </p:txBody>
       </p:sp>
@@ -4190,7 +4196,6 @@
               <a:rPr lang="en-CA" dirty="0"/>
               <a:t> cipher, the key is the number of characters to shift the cipher alphabet.</a:t>
             </a:r>
-            <a:endParaRPr lang="en-CA" dirty="0"/>
           </a:p>
         </p:txBody>
       </p:sp>
@@ -4467,8 +4472,8 @@
           </a:p>
           <a:p>
             <a:r>
-              <a:rPr lang="en-CA" dirty="0" err="1"/>
-              <a:t>ymjwjnxstbbfdnhfsljyymnxbwtsl</a:t>
+              <a:rPr lang="en-CA"/>
+              <a:t>ymjwjnxstbfdnhfsljyymnxbwtsl</a:t>
             </a:r>
             <a:endParaRPr lang="en-CA" dirty="0"/>
           </a:p>
@@ -4581,7 +4586,6 @@
               <a:rPr lang="en-CA" dirty="0"/>
               <a:t>An example encryption using the above key:</a:t>
             </a:r>
-            <a:endParaRPr lang="en-CA" dirty="0"/>
           </a:p>
         </p:txBody>
       </p:sp>

</xml_diff>